<commit_message>
Doc edits to remove //TODOs (all resolved now)
</commit_message>
<xml_diff>
--- a/docs/images/qumulo-cloud-q-architecture_diagram.pptx
+++ b/docs/images/qumulo-cloud-q-architecture_diagram.pptx
@@ -331,7 +331,7 @@
               <a:pPr>
                 <a:defRPr/>
               </a:pPr>
-              <a:t>12/15/2021</a:t>
+              <a:t>12/21/2021</a:t>
             </a:fld>
             <a:endParaRPr lang="en-US" dirty="0"/>
           </a:p>
@@ -15470,7 +15470,7 @@
         </p:nvSpPr>
         <p:spPr>
           <a:xfrm>
-            <a:off x="6047925" y="1505662"/>
+            <a:off x="5075098" y="1505662"/>
             <a:ext cx="1435059" cy="1196869"/>
           </a:xfrm>
           <a:prstGeom prst="rect">
@@ -15543,7 +15543,7 @@
         </p:nvSpPr>
         <p:spPr>
           <a:xfrm>
-            <a:off x="6047925" y="2819400"/>
+            <a:off x="5075098" y="2819400"/>
             <a:ext cx="1435061" cy="2521791"/>
           </a:xfrm>
           <a:prstGeom prst="rect">
@@ -15682,8 +15682,8 @@
         </p:nvSpPr>
         <p:spPr>
           <a:xfrm>
-            <a:off x="588108" y="609600"/>
-            <a:ext cx="9628045" cy="5029200"/>
+            <a:off x="588109" y="609600"/>
+            <a:ext cx="8916520" cy="5029200"/>
           </a:xfrm>
           <a:prstGeom prst="rect">
             <a:avLst/>
@@ -15983,7 +15983,7 @@
         </p:blipFill>
         <p:spPr>
           <a:xfrm>
-            <a:off x="6054478" y="1509373"/>
+            <a:off x="5081651" y="1509373"/>
             <a:ext cx="274320" cy="274320"/>
           </a:xfrm>
           <a:prstGeom prst="rect">
@@ -16019,7 +16019,7 @@
         </p:blipFill>
         <p:spPr>
           <a:xfrm>
-            <a:off x="6044710" y="2819400"/>
+            <a:off x="5071883" y="2819400"/>
             <a:ext cx="274320" cy="274320"/>
           </a:xfrm>
           <a:prstGeom prst="rect">
@@ -16043,7 +16043,7 @@
         </p:nvSpPr>
         <p:spPr bwMode="auto">
           <a:xfrm>
-            <a:off x="8943681" y="2874564"/>
+            <a:off x="8181681" y="2874564"/>
             <a:ext cx="1193800" cy="276999"/>
           </a:xfrm>
           <a:prstGeom prst="rect">
@@ -16204,7 +16204,7 @@
         </p:nvSpPr>
         <p:spPr bwMode="auto">
           <a:xfrm>
-            <a:off x="7831824" y="2869271"/>
+            <a:off x="7069824" y="2869271"/>
             <a:ext cx="1035068" cy="276999"/>
           </a:xfrm>
           <a:prstGeom prst="rect">
@@ -16365,7 +16365,7 @@
         </p:nvSpPr>
         <p:spPr bwMode="auto">
           <a:xfrm>
-            <a:off x="7788480" y="1673536"/>
+            <a:off x="7026480" y="1673536"/>
             <a:ext cx="1102903" cy="276999"/>
           </a:xfrm>
           <a:prstGeom prst="rect">
@@ -16526,7 +16526,7 @@
         </p:nvSpPr>
         <p:spPr bwMode="auto">
           <a:xfrm>
-            <a:off x="8857465" y="1678255"/>
+            <a:off x="8095465" y="1678255"/>
             <a:ext cx="1358688" cy="276999"/>
           </a:xfrm>
           <a:prstGeom prst="rect">
@@ -16687,7 +16687,7 @@
         </p:nvSpPr>
         <p:spPr bwMode="auto">
           <a:xfrm>
-            <a:off x="7772400" y="4093764"/>
+            <a:off x="7010400" y="4083009"/>
             <a:ext cx="1193800" cy="276999"/>
           </a:xfrm>
           <a:prstGeom prst="rect">
@@ -17625,7 +17625,7 @@
         </p:nvSpPr>
         <p:spPr bwMode="auto">
           <a:xfrm>
-            <a:off x="8991600" y="5344893"/>
+            <a:off x="8229600" y="5321872"/>
             <a:ext cx="1126348" cy="276999"/>
           </a:xfrm>
           <a:prstGeom prst="rect">
@@ -17855,7 +17855,7 @@
         </p:nvSpPr>
         <p:spPr>
           <a:xfrm>
-            <a:off x="5925827" y="914399"/>
+            <a:off x="4953000" y="914399"/>
             <a:ext cx="1711415" cy="4603161"/>
           </a:xfrm>
           <a:prstGeom prst="rect">
@@ -18105,7 +18105,7 @@
         <p:spPr bwMode="auto">
           <a:xfrm>
             <a:off x="909516" y="1219200"/>
-            <a:ext cx="6856448" cy="4189855"/>
+            <a:ext cx="5948484" cy="4189855"/>
           </a:xfrm>
           <a:prstGeom prst="rect">
             <a:avLst/>
@@ -18189,7 +18189,7 @@
         </p:blipFill>
         <p:spPr bwMode="auto">
           <a:xfrm>
-            <a:off x="7983505" y="914400"/>
+            <a:off x="7221505" y="914400"/>
             <a:ext cx="762000" cy="762000"/>
           </a:xfrm>
           <a:prstGeom prst="rect">
@@ -18249,7 +18249,7 @@
         </p:blipFill>
         <p:spPr bwMode="auto">
           <a:xfrm>
-            <a:off x="9173352" y="916255"/>
+            <a:off x="8411352" y="916255"/>
             <a:ext cx="762000" cy="762000"/>
           </a:xfrm>
           <a:prstGeom prst="rect">
@@ -18309,7 +18309,7 @@
         </p:blipFill>
         <p:spPr bwMode="auto">
           <a:xfrm>
-            <a:off x="7983505" y="2107271"/>
+            <a:off x="7221505" y="2107271"/>
             <a:ext cx="762000" cy="762000"/>
           </a:xfrm>
           <a:prstGeom prst="rect">
@@ -18369,7 +18369,7 @@
         </p:blipFill>
         <p:spPr bwMode="auto">
           <a:xfrm>
-            <a:off x="9164373" y="2107271"/>
+            <a:off x="8402373" y="2107271"/>
             <a:ext cx="762000" cy="762000"/>
           </a:xfrm>
           <a:prstGeom prst="rect">
@@ -18429,7 +18429,7 @@
         </p:blipFill>
         <p:spPr bwMode="auto">
           <a:xfrm>
-            <a:off x="7983505" y="3320871"/>
+            <a:off x="7221505" y="3311756"/>
             <a:ext cx="762000" cy="762000"/>
           </a:xfrm>
           <a:prstGeom prst="rect">
@@ -18489,7 +18489,7 @@
         </p:blipFill>
         <p:spPr bwMode="auto">
           <a:xfrm>
-            <a:off x="9172216" y="4572000"/>
+            <a:off x="8410216" y="4550620"/>
             <a:ext cx="762000" cy="762000"/>
           </a:xfrm>
           <a:prstGeom prst="rect">
@@ -18548,7 +18548,7 @@
         </p:blipFill>
         <p:spPr>
           <a:xfrm>
-            <a:off x="7977453" y="4550620"/>
+            <a:off x="7215453" y="4550620"/>
             <a:ext cx="768052" cy="768052"/>
           </a:xfrm>
           <a:prstGeom prst="rect">
@@ -18570,7 +18570,7 @@
         </p:nvSpPr>
         <p:spPr>
           <a:xfrm>
-            <a:off x="7493127" y="5321872"/>
+            <a:off x="6781800" y="5321872"/>
             <a:ext cx="1651819" cy="276999"/>
           </a:xfrm>
           <a:prstGeom prst="rect">
@@ -18624,7 +18624,7 @@
         </p:blipFill>
         <p:spPr bwMode="auto">
           <a:xfrm>
-            <a:off x="9167300" y="3311756"/>
+            <a:off x="8405300" y="3311756"/>
             <a:ext cx="768052" cy="768052"/>
           </a:xfrm>
           <a:prstGeom prst="rect">
@@ -18671,8 +18671,8 @@
         </p:nvSpPr>
         <p:spPr bwMode="auto">
           <a:xfrm>
-            <a:off x="8399072" y="4083008"/>
-            <a:ext cx="2310560" cy="276999"/>
+            <a:off x="8077200" y="4083009"/>
+            <a:ext cx="1427428" cy="276999"/>
           </a:xfrm>
           <a:prstGeom prst="rect">
             <a:avLst/>
@@ -18812,206 +18812,6 @@
                 <a:cs typeface="Arial" panose="020B0604020202020204" pitchFamily="34" charset="0"/>
               </a:rPr>
               <a:t>Systems Manager</a:t>
-            </a:r>
-          </a:p>
-        </p:txBody>
-      </p:sp>
-      <p:pic>
-        <p:nvPicPr>
-          <p:cNvPr id="54" name="Graphic 24">
-            <a:extLst>
-              <a:ext uri="{FF2B5EF4-FFF2-40B4-BE49-F238E27FC236}">
-                <a16:creationId xmlns:a16="http://schemas.microsoft.com/office/drawing/2014/main" id="{CBF9A1AE-EA33-164B-9336-AB71D23DCDC1}"/>
-              </a:ext>
-            </a:extLst>
-          </p:cNvPr>
-          <p:cNvPicPr>
-            <a:picLocks noChangeAspect="1" noChangeArrowheads="1"/>
-          </p:cNvPicPr>
-          <p:nvPr/>
-        </p:nvPicPr>
-        <p:blipFill>
-          <a:blip r:embed="rId27">
-            <a:extLst>
-              <a:ext uri="{28A0092B-C50C-407E-A947-70E740481C1C}">
-                <a14:useLocalDpi xmlns:a14="http://schemas.microsoft.com/office/drawing/2010/main" val="0"/>
-              </a:ext>
-            </a:extLst>
-          </a:blip>
-          <a:srcRect/>
-          <a:stretch>
-            <a:fillRect/>
-          </a:stretch>
-        </p:blipFill>
-        <p:spPr bwMode="auto">
-          <a:xfrm>
-            <a:off x="5067838" y="2209800"/>
-            <a:ext cx="457200" cy="457200"/>
-          </a:xfrm>
-          <a:prstGeom prst="rect">
-            <a:avLst/>
-          </a:prstGeom>
-          <a:noFill/>
-          <a:ln>
-            <a:noFill/>
-          </a:ln>
-          <a:extLst>
-            <a:ext uri="{909E8E84-426E-40DD-AFC4-6F175D3DCCD1}">
-              <a14:hiddenFill xmlns:a14="http://schemas.microsoft.com/office/drawing/2010/main">
-                <a:solidFill>
-                  <a:srgbClr val="FFFFFF"/>
-                </a:solidFill>
-              </a14:hiddenFill>
-            </a:ext>
-            <a:ext uri="{91240B29-F687-4F45-9708-019B960494DF}">
-              <a14:hiddenLine xmlns:a14="http://schemas.microsoft.com/office/drawing/2010/main" w="9525">
-                <a:solidFill>
-                  <a:srgbClr val="000000"/>
-                </a:solidFill>
-                <a:miter lim="800000"/>
-                <a:headEnd/>
-                <a:tailEnd/>
-              </a14:hiddenLine>
-            </a:ext>
-          </a:extLst>
-        </p:spPr>
-      </p:pic>
-      <p:sp>
-        <p:nvSpPr>
-          <p:cNvPr id="59" name="TextBox 22">
-            <a:extLst>
-              <a:ext uri="{FF2B5EF4-FFF2-40B4-BE49-F238E27FC236}">
-                <a16:creationId xmlns:a16="http://schemas.microsoft.com/office/drawing/2014/main" id="{B0552522-1C65-CB4F-98EB-2B5405E1252E}"/>
-              </a:ext>
-            </a:extLst>
-          </p:cNvPr>
-          <p:cNvSpPr txBox="1">
-            <a:spLocks noChangeArrowheads="1"/>
-          </p:cNvSpPr>
-          <p:nvPr/>
-        </p:nvSpPr>
-        <p:spPr bwMode="auto">
-          <a:xfrm>
-            <a:off x="4620684" y="2674717"/>
-            <a:ext cx="1339850" cy="646331"/>
-          </a:xfrm>
-          <a:prstGeom prst="rect">
-            <a:avLst/>
-          </a:prstGeom>
-          <a:noFill/>
-          <a:ln>
-            <a:noFill/>
-          </a:ln>
-          <a:extLst>
-            <a:ext uri="{909E8E84-426E-40DD-AFC4-6F175D3DCCD1}">
-              <a14:hiddenFill xmlns:a14="http://schemas.microsoft.com/office/drawing/2010/main">
-                <a:solidFill>
-                  <a:srgbClr val="FFFFFF"/>
-                </a:solidFill>
-              </a14:hiddenFill>
-            </a:ext>
-            <a:ext uri="{91240B29-F687-4F45-9708-019B960494DF}">
-              <a14:hiddenLine xmlns:a14="http://schemas.microsoft.com/office/drawing/2010/main" w="9525">
-                <a:solidFill>
-                  <a:srgbClr val="000000"/>
-                </a:solidFill>
-                <a:miter lim="800000"/>
-                <a:headEnd/>
-                <a:tailEnd/>
-              </a14:hiddenLine>
-            </a:ext>
-          </a:extLst>
-        </p:spPr>
-        <p:style>
-          <a:lnRef idx="0">
-            <a:scrgbClr r="0" g="0" b="0"/>
-          </a:lnRef>
-          <a:fillRef idx="0">
-            <a:scrgbClr r="0" g="0" b="0"/>
-          </a:fillRef>
-          <a:effectRef idx="0">
-            <a:scrgbClr r="0" g="0" b="0"/>
-          </a:effectRef>
-          <a:fontRef idx="major"/>
-        </p:style>
-        <p:txBody>
-          <a:bodyPr wrap="square">
-            <a:spAutoFit/>
-          </a:bodyPr>
-          <a:lstStyle>
-            <a:lvl1pPr>
-              <a:defRPr>
-                <a:latin typeface="+mj-lt"/>
-                <a:ea typeface="+mj-ea"/>
-                <a:cs typeface="+mj-cs"/>
-              </a:defRPr>
-            </a:lvl1pPr>
-            <a:lvl2pPr>
-              <a:defRPr>
-                <a:latin typeface="+mj-lt"/>
-                <a:ea typeface="+mj-ea"/>
-                <a:cs typeface="+mj-cs"/>
-              </a:defRPr>
-            </a:lvl2pPr>
-            <a:lvl3pPr>
-              <a:defRPr>
-                <a:latin typeface="+mj-lt"/>
-                <a:ea typeface="+mj-ea"/>
-                <a:cs typeface="+mj-cs"/>
-              </a:defRPr>
-            </a:lvl3pPr>
-            <a:lvl4pPr>
-              <a:defRPr>
-                <a:latin typeface="+mj-lt"/>
-                <a:ea typeface="+mj-ea"/>
-                <a:cs typeface="+mj-cs"/>
-              </a:defRPr>
-            </a:lvl4pPr>
-            <a:lvl5pPr>
-              <a:defRPr>
-                <a:latin typeface="+mj-lt"/>
-                <a:ea typeface="+mj-ea"/>
-                <a:cs typeface="+mj-cs"/>
-              </a:defRPr>
-            </a:lvl5pPr>
-            <a:lvl6pPr>
-              <a:defRPr>
-                <a:latin typeface="+mj-lt"/>
-                <a:ea typeface="+mj-ea"/>
-                <a:cs typeface="+mj-cs"/>
-              </a:defRPr>
-            </a:lvl6pPr>
-            <a:lvl7pPr>
-              <a:defRPr>
-                <a:latin typeface="+mj-lt"/>
-                <a:ea typeface="+mj-ea"/>
-                <a:cs typeface="+mj-cs"/>
-              </a:defRPr>
-            </a:lvl7pPr>
-            <a:lvl8pPr>
-              <a:defRPr>
-                <a:latin typeface="+mj-lt"/>
-                <a:ea typeface="+mj-ea"/>
-                <a:cs typeface="+mj-cs"/>
-              </a:defRPr>
-            </a:lvl8pPr>
-            <a:lvl9pPr>
-              <a:defRPr>
-                <a:latin typeface="+mj-lt"/>
-                <a:ea typeface="+mj-ea"/>
-                <a:cs typeface="+mj-cs"/>
-              </a:defRPr>
-            </a:lvl9pPr>
-          </a:lstStyle>
-          <a:p>
-            <a:pPr algn="ctr" eaLnBrk="1" hangingPunct="1"/>
-            <a:r>
-              <a:rPr lang="en-US" altLang="en-US" sz="1200" dirty="0">
-                <a:latin typeface="Arial" panose="020B0604020202020204" pitchFamily="34" charset="0"/>
-                <a:ea typeface="Amazon Ember" panose="020B0603020204020204" pitchFamily="34" charset="0"/>
-                <a:cs typeface="Arial" panose="020B0604020202020204" pitchFamily="34" charset="0"/>
-              </a:rPr>
-              <a:t>Network Load Balancer (optional)</a:t>
             </a:r>
           </a:p>
         </p:txBody>

</xml_diff>